<commit_message>
did salary instead of type :P
</commit_message>
<xml_diff>
--- a/M1-F5/Feature5.pptx
+++ b/M1-F5/Feature5.pptx
@@ -290,7 +290,8 @@
           <a:p>
             <a:fld id="{8C794B6C-F5CC-44F3-8C69-0E5FA81F656C}" type="datetimeFigureOut">
               <a:rPr lang="en-US" smtClean="0"/>
-              <a:t>10/3/2012</a:t>
+              <a:pPr/>
+              <a:t>10/4/2012</a:t>
             </a:fld>
             <a:endParaRPr lang="en-US"/>
           </a:p>
@@ -332,6 +333,7 @@
           <a:p>
             <a:fld id="{5B4AFC08-AE42-4268-A9F4-89E8DF83110E}" type="slidenum">
               <a:rPr lang="en-US" smtClean="0"/>
+              <a:pPr/>
               <a:t>‹#›</a:t>
             </a:fld>
             <a:endParaRPr lang="en-US"/>
@@ -455,7 +457,8 @@
           <a:p>
             <a:fld id="{8C794B6C-F5CC-44F3-8C69-0E5FA81F656C}" type="datetimeFigureOut">
               <a:rPr lang="en-US" smtClean="0"/>
-              <a:t>10/3/2012</a:t>
+              <a:pPr/>
+              <a:t>10/4/2012</a:t>
             </a:fld>
             <a:endParaRPr lang="en-US"/>
           </a:p>
@@ -497,6 +500,7 @@
           <a:p>
             <a:fld id="{5B4AFC08-AE42-4268-A9F4-89E8DF83110E}" type="slidenum">
               <a:rPr lang="en-US" smtClean="0"/>
+              <a:pPr/>
               <a:t>‹#›</a:t>
             </a:fld>
             <a:endParaRPr lang="en-US"/>
@@ -630,7 +634,8 @@
           <a:p>
             <a:fld id="{8C794B6C-F5CC-44F3-8C69-0E5FA81F656C}" type="datetimeFigureOut">
               <a:rPr lang="en-US" smtClean="0"/>
-              <a:t>10/3/2012</a:t>
+              <a:pPr/>
+              <a:t>10/4/2012</a:t>
             </a:fld>
             <a:endParaRPr lang="en-US"/>
           </a:p>
@@ -672,6 +677,7 @@
           <a:p>
             <a:fld id="{5B4AFC08-AE42-4268-A9F4-89E8DF83110E}" type="slidenum">
               <a:rPr lang="en-US" smtClean="0"/>
+              <a:pPr/>
               <a:t>‹#›</a:t>
             </a:fld>
             <a:endParaRPr lang="en-US"/>
@@ -795,7 +801,8 @@
           <a:p>
             <a:fld id="{8C794B6C-F5CC-44F3-8C69-0E5FA81F656C}" type="datetimeFigureOut">
               <a:rPr lang="en-US" smtClean="0"/>
-              <a:t>10/3/2012</a:t>
+              <a:pPr/>
+              <a:t>10/4/2012</a:t>
             </a:fld>
             <a:endParaRPr lang="en-US"/>
           </a:p>
@@ -837,6 +844,7 @@
           <a:p>
             <a:fld id="{5B4AFC08-AE42-4268-A9F4-89E8DF83110E}" type="slidenum">
               <a:rPr lang="en-US" smtClean="0"/>
+              <a:pPr/>
               <a:t>‹#›</a:t>
             </a:fld>
             <a:endParaRPr lang="en-US"/>
@@ -1036,7 +1044,8 @@
           <a:p>
             <a:fld id="{8C794B6C-F5CC-44F3-8C69-0E5FA81F656C}" type="datetimeFigureOut">
               <a:rPr lang="en-US" smtClean="0"/>
-              <a:t>10/3/2012</a:t>
+              <a:pPr/>
+              <a:t>10/4/2012</a:t>
             </a:fld>
             <a:endParaRPr lang="en-US"/>
           </a:p>
@@ -1078,6 +1087,7 @@
           <a:p>
             <a:fld id="{5B4AFC08-AE42-4268-A9F4-89E8DF83110E}" type="slidenum">
               <a:rPr lang="en-US" smtClean="0"/>
+              <a:pPr/>
               <a:t>‹#›</a:t>
             </a:fld>
             <a:endParaRPr lang="en-US"/>
@@ -1319,7 +1329,8 @@
           <a:p>
             <a:fld id="{8C794B6C-F5CC-44F3-8C69-0E5FA81F656C}" type="datetimeFigureOut">
               <a:rPr lang="en-US" smtClean="0"/>
-              <a:t>10/3/2012</a:t>
+              <a:pPr/>
+              <a:t>10/4/2012</a:t>
             </a:fld>
             <a:endParaRPr lang="en-US"/>
           </a:p>
@@ -1361,6 +1372,7 @@
           <a:p>
             <a:fld id="{5B4AFC08-AE42-4268-A9F4-89E8DF83110E}" type="slidenum">
               <a:rPr lang="en-US" smtClean="0"/>
+              <a:pPr/>
               <a:t>‹#›</a:t>
             </a:fld>
             <a:endParaRPr lang="en-US"/>
@@ -1736,7 +1748,8 @@
           <a:p>
             <a:fld id="{8C794B6C-F5CC-44F3-8C69-0E5FA81F656C}" type="datetimeFigureOut">
               <a:rPr lang="en-US" smtClean="0"/>
-              <a:t>10/3/2012</a:t>
+              <a:pPr/>
+              <a:t>10/4/2012</a:t>
             </a:fld>
             <a:endParaRPr lang="en-US"/>
           </a:p>
@@ -1778,6 +1791,7 @@
           <a:p>
             <a:fld id="{5B4AFC08-AE42-4268-A9F4-89E8DF83110E}" type="slidenum">
               <a:rPr lang="en-US" smtClean="0"/>
+              <a:pPr/>
               <a:t>‹#›</a:t>
             </a:fld>
             <a:endParaRPr lang="en-US"/>
@@ -1849,7 +1863,8 @@
           <a:p>
             <a:fld id="{8C794B6C-F5CC-44F3-8C69-0E5FA81F656C}" type="datetimeFigureOut">
               <a:rPr lang="en-US" smtClean="0"/>
-              <a:t>10/3/2012</a:t>
+              <a:pPr/>
+              <a:t>10/4/2012</a:t>
             </a:fld>
             <a:endParaRPr lang="en-US"/>
           </a:p>
@@ -1891,6 +1906,7 @@
           <a:p>
             <a:fld id="{5B4AFC08-AE42-4268-A9F4-89E8DF83110E}" type="slidenum">
               <a:rPr lang="en-US" smtClean="0"/>
+              <a:pPr/>
               <a:t>‹#›</a:t>
             </a:fld>
             <a:endParaRPr lang="en-US"/>
@@ -1939,7 +1955,8 @@
           <a:p>
             <a:fld id="{8C794B6C-F5CC-44F3-8C69-0E5FA81F656C}" type="datetimeFigureOut">
               <a:rPr lang="en-US" smtClean="0"/>
-              <a:t>10/3/2012</a:t>
+              <a:pPr/>
+              <a:t>10/4/2012</a:t>
             </a:fld>
             <a:endParaRPr lang="en-US"/>
           </a:p>
@@ -1981,6 +1998,7 @@
           <a:p>
             <a:fld id="{5B4AFC08-AE42-4268-A9F4-89E8DF83110E}" type="slidenum">
               <a:rPr lang="en-US" smtClean="0"/>
+              <a:pPr/>
               <a:t>‹#›</a:t>
             </a:fld>
             <a:endParaRPr lang="en-US"/>
@@ -2211,7 +2229,8 @@
           <a:p>
             <a:fld id="{8C794B6C-F5CC-44F3-8C69-0E5FA81F656C}" type="datetimeFigureOut">
               <a:rPr lang="en-US" smtClean="0"/>
-              <a:t>10/3/2012</a:t>
+              <a:pPr/>
+              <a:t>10/4/2012</a:t>
             </a:fld>
             <a:endParaRPr lang="en-US"/>
           </a:p>
@@ -2253,6 +2272,7 @@
           <a:p>
             <a:fld id="{5B4AFC08-AE42-4268-A9F4-89E8DF83110E}" type="slidenum">
               <a:rPr lang="en-US" smtClean="0"/>
+              <a:pPr/>
               <a:t>‹#›</a:t>
             </a:fld>
             <a:endParaRPr lang="en-US"/>
@@ -2459,7 +2479,8 @@
           <a:p>
             <a:fld id="{8C794B6C-F5CC-44F3-8C69-0E5FA81F656C}" type="datetimeFigureOut">
               <a:rPr lang="en-US" smtClean="0"/>
-              <a:t>10/3/2012</a:t>
+              <a:pPr/>
+              <a:t>10/4/2012</a:t>
             </a:fld>
             <a:endParaRPr lang="en-US"/>
           </a:p>
@@ -2501,6 +2522,7 @@
           <a:p>
             <a:fld id="{5B4AFC08-AE42-4268-A9F4-89E8DF83110E}" type="slidenum">
               <a:rPr lang="en-US" smtClean="0"/>
+              <a:pPr/>
               <a:t>‹#›</a:t>
             </a:fld>
             <a:endParaRPr lang="en-US"/>
@@ -2667,7 +2689,8 @@
           <a:p>
             <a:fld id="{8C794B6C-F5CC-44F3-8C69-0E5FA81F656C}" type="datetimeFigureOut">
               <a:rPr lang="en-US" smtClean="0"/>
-              <a:t>10/3/2012</a:t>
+              <a:pPr/>
+              <a:t>10/4/2012</a:t>
             </a:fld>
             <a:endParaRPr lang="en-US"/>
           </a:p>
@@ -2745,6 +2768,7 @@
           <a:p>
             <a:fld id="{5B4AFC08-AE42-4268-A9F4-89E8DF83110E}" type="slidenum">
               <a:rPr lang="en-US" smtClean="0"/>
+              <a:pPr/>
               <a:t>‹#›</a:t>
             </a:fld>
             <a:endParaRPr lang="en-US"/>
@@ -3078,14 +3102,24 @@
           <a:p>
             <a:r>
               <a:rPr lang="en-US" dirty="0" smtClean="0"/>
-              <a:t>Allow users to search for jobs by type i.e. full-time, part-time.</a:t>
-            </a:r>
-          </a:p>
-          <a:p>
+              <a:t>Allow users to search for jobs by </a:t>
+            </a:r>
             <a:r>
               <a:rPr lang="en-US" dirty="0" smtClean="0"/>
-              <a:t>Useful for users who are not interested in certain types of employment</a:t>
-            </a:r>
+              <a:t>salary range</a:t>
+            </a:r>
+            <a:endParaRPr lang="en-US" dirty="0" smtClean="0"/>
+          </a:p>
+          <a:p>
+            <a:r>
+              <a:rPr lang="en-US" dirty="0" smtClean="0"/>
+              <a:t>Useful for users </a:t>
+            </a:r>
+            <a:r>
+              <a:rPr lang="en-US" dirty="0" smtClean="0"/>
+              <a:t>who want a certain salary range.</a:t>
+            </a:r>
+            <a:endParaRPr lang="en-US" dirty="0" smtClean="0"/>
           </a:p>
           <a:p>
             <a:endParaRPr lang="en-US" dirty="0"/>
@@ -3195,8 +3229,8 @@
         </p:nvSpPr>
         <p:spPr>
           <a:xfrm>
-            <a:off x="3276600" y="3657600"/>
-            <a:ext cx="1524000" cy="1447800"/>
+            <a:off x="3352800" y="4953000"/>
+            <a:ext cx="3124200" cy="609600"/>
           </a:xfrm>
           <a:prstGeom prst="ellipse">
             <a:avLst/>
@@ -3303,203 +3337,115 @@
           </a:bodyPr>
           <a:lstStyle/>
           <a:p>
-            <a:pPr fontAlgn="base"/>
-            <a:r>
-              <a:rPr lang="en-US" sz="1400" dirty="0" smtClean="0"/>
-              <a:t>User </a:t>
-            </a:r>
-            <a:r>
-              <a:rPr lang="en-US" sz="1400" dirty="0"/>
-              <a:t>searches for job type</a:t>
-            </a:r>
-          </a:p>
-          <a:p>
-            <a:pPr lvl="1" fontAlgn="base"/>
-            <a:r>
-              <a:rPr lang="en-US" sz="1400" dirty="0" smtClean="0"/>
-              <a:t>User </a:t>
-            </a:r>
-            <a:r>
-              <a:rPr lang="en-US" sz="1400" dirty="0"/>
-              <a:t>clicks on ‘Advanced Search’ link</a:t>
-            </a:r>
-          </a:p>
-          <a:p>
-            <a:pPr lvl="1" fontAlgn="base"/>
-            <a:r>
-              <a:rPr lang="en-US" sz="1400" dirty="0" smtClean="0"/>
-              <a:t>Advanced </a:t>
-            </a:r>
-            <a:r>
-              <a:rPr lang="en-US" sz="1400" dirty="0"/>
-              <a:t>search page is displayed</a:t>
-            </a:r>
-          </a:p>
-          <a:p>
-            <a:pPr lvl="1" fontAlgn="base"/>
-            <a:r>
-              <a:rPr lang="en-US" sz="1400" dirty="0" smtClean="0"/>
-              <a:t>User </a:t>
-            </a:r>
-            <a:r>
-              <a:rPr lang="en-US" sz="1400" dirty="0"/>
-              <a:t>checks ‘full-time’ box</a:t>
-            </a:r>
-          </a:p>
-          <a:p>
-            <a:pPr lvl="1" fontAlgn="base"/>
-            <a:r>
-              <a:rPr lang="en-US" sz="1400" dirty="0" smtClean="0"/>
-              <a:t>User </a:t>
-            </a:r>
-            <a:r>
-              <a:rPr lang="en-US" sz="1400" dirty="0"/>
-              <a:t>clicks ‘search’</a:t>
-            </a:r>
-          </a:p>
-          <a:p>
-            <a:pPr lvl="1" fontAlgn="base"/>
-            <a:r>
-              <a:rPr lang="en-US" sz="1400" dirty="0" smtClean="0"/>
-              <a:t>Search </a:t>
-            </a:r>
-            <a:r>
-              <a:rPr lang="en-US" sz="1400" dirty="0"/>
-              <a:t>page is displayed</a:t>
-            </a:r>
-          </a:p>
-          <a:p>
-            <a:pPr fontAlgn="base"/>
-            <a:r>
-              <a:rPr lang="en-US" sz="1400" dirty="0" smtClean="0"/>
+            <a:pPr lvl="0"/>
+            <a:r>
+              <a:rPr lang="en-US" sz="1800" dirty="0" smtClean="0"/>
+              <a:t>User searches for Salary</a:t>
+            </a:r>
+          </a:p>
+          <a:p>
+            <a:pPr lvl="1"/>
+            <a:r>
+              <a:rPr lang="en-US" sz="1800" dirty="0" smtClean="0"/>
+              <a:t>User clicks on ‘Advanced Search’ link</a:t>
+            </a:r>
+          </a:p>
+          <a:p>
+            <a:pPr lvl="1"/>
+            <a:r>
+              <a:rPr lang="en-US" sz="1800" dirty="0" smtClean="0"/>
+              <a:t>Advanced search page is displayed</a:t>
+            </a:r>
+          </a:p>
+          <a:p>
+            <a:pPr lvl="1"/>
+            <a:r>
+              <a:rPr lang="en-US" sz="1800" dirty="0" smtClean="0"/>
+              <a:t>User mat specify minimum range</a:t>
+            </a:r>
+          </a:p>
+          <a:p>
+            <a:pPr lvl="1"/>
+            <a:r>
+              <a:rPr lang="en-US" sz="1800" dirty="0" smtClean="0"/>
+              <a:t>User may specify maximum range </a:t>
+            </a:r>
+          </a:p>
+          <a:p>
+            <a:pPr lvl="1"/>
+            <a:r>
+              <a:rPr lang="en-US" sz="1800" dirty="0" smtClean="0"/>
+              <a:t>User clicks ‘search’</a:t>
+            </a:r>
+          </a:p>
+          <a:p>
+            <a:pPr lvl="1"/>
+            <a:r>
+              <a:rPr lang="en-US" sz="1800" dirty="0" smtClean="0"/>
+              <a:t>Search page is displayed</a:t>
+            </a:r>
+          </a:p>
+          <a:p>
+            <a:pPr lvl="0"/>
+            <a:r>
+              <a:rPr lang="en-US" sz="1800" dirty="0" smtClean="0"/>
               <a:t>Pre-conditions</a:t>
             </a:r>
-            <a:endParaRPr lang="en-US" sz="1400" dirty="0"/>
-          </a:p>
-          <a:p>
-            <a:pPr lvl="1" fontAlgn="base"/>
-            <a:r>
-              <a:rPr lang="en-US" sz="1400" dirty="0" smtClean="0"/>
-              <a:t>User </a:t>
-            </a:r>
-            <a:r>
-              <a:rPr lang="en-US" sz="1400" dirty="0"/>
-              <a:t>is at home page.</a:t>
-            </a:r>
-          </a:p>
-          <a:p>
-            <a:pPr fontAlgn="base"/>
-            <a:r>
-              <a:rPr lang="en-US" sz="1400" dirty="0" smtClean="0"/>
+          </a:p>
+          <a:p>
+            <a:pPr lvl="1"/>
+            <a:r>
+              <a:rPr lang="en-US" sz="1800" dirty="0" smtClean="0"/>
+              <a:t>User is at home page.</a:t>
+            </a:r>
+          </a:p>
+          <a:p>
+            <a:pPr lvl="0"/>
+            <a:r>
+              <a:rPr lang="en-US" sz="1800" dirty="0" smtClean="0"/>
               <a:t>Post-conditions</a:t>
             </a:r>
-            <a:endParaRPr lang="en-US" sz="1400" dirty="0"/>
-          </a:p>
-          <a:p>
-            <a:pPr lvl="1" fontAlgn="base"/>
-            <a:r>
-              <a:rPr lang="en-US" sz="1400" dirty="0" smtClean="0"/>
-              <a:t>Only </a:t>
-            </a:r>
-            <a:r>
-              <a:rPr lang="en-US" sz="1400" dirty="0"/>
-              <a:t>jobs of type ‘full-time’ are displayed on search page</a:t>
-            </a:r>
-          </a:p>
-          <a:p>
-            <a:pPr fontAlgn="base"/>
-            <a:r>
-              <a:rPr lang="en-US" sz="1400" dirty="0" smtClean="0"/>
-              <a:t>Required </a:t>
-            </a:r>
-            <a:r>
-              <a:rPr lang="en-US" sz="1400" dirty="0"/>
-              <a:t>Input</a:t>
-            </a:r>
-          </a:p>
-          <a:p>
-            <a:pPr lvl="1" fontAlgn="base"/>
-            <a:r>
-              <a:rPr lang="en-US" sz="1400" dirty="0"/>
-              <a:t> </a:t>
-            </a:r>
-            <a:r>
-              <a:rPr lang="en-US" sz="1400" dirty="0" smtClean="0"/>
+          </a:p>
+          <a:p>
+            <a:pPr lvl="1"/>
+            <a:r>
+              <a:rPr lang="en-US" sz="1800" dirty="0" smtClean="0"/>
+              <a:t>Only jobs within specified pay range are shown.</a:t>
+            </a:r>
+          </a:p>
+          <a:p>
+            <a:pPr lvl="0"/>
+            <a:r>
+              <a:rPr lang="en-US" sz="1800" dirty="0" smtClean="0"/>
+              <a:t>Required Input</a:t>
+            </a:r>
+          </a:p>
+          <a:p>
+            <a:pPr lvl="1"/>
+            <a:r>
+              <a:rPr lang="en-US" sz="1800" dirty="0" smtClean="0"/>
               <a:t>None</a:t>
             </a:r>
-            <a:endParaRPr lang="en-US" sz="1400" dirty="0"/>
-          </a:p>
-          <a:p>
-            <a:pPr fontAlgn="base"/>
-            <a:r>
-              <a:rPr lang="en-US" sz="1400" dirty="0" smtClean="0"/>
+          </a:p>
+          <a:p>
+            <a:pPr lvl="0"/>
+            <a:r>
+              <a:rPr lang="en-US" sz="1800" dirty="0" smtClean="0"/>
               <a:t>Output</a:t>
             </a:r>
-            <a:endParaRPr lang="en-US" sz="1400" dirty="0"/>
-          </a:p>
-          <a:p>
-            <a:pPr lvl="1" fontAlgn="base"/>
-            <a:r>
-              <a:rPr lang="en-US" sz="1400" dirty="0" smtClean="0"/>
-              <a:t>List </a:t>
-            </a:r>
-            <a:r>
-              <a:rPr lang="en-US" sz="1400" dirty="0"/>
-              <a:t>of full-time jobs</a:t>
-            </a:r>
-          </a:p>
-          <a:p>
-            <a:pPr fontAlgn="base"/>
-            <a:r>
-              <a:rPr lang="en-US" sz="1400" dirty="0" smtClean="0"/>
-              <a:t>Notes</a:t>
-            </a:r>
-            <a:endParaRPr lang="en-US" sz="1400" dirty="0"/>
-          </a:p>
-          <a:p>
-            <a:pPr lvl="1" fontAlgn="base"/>
-            <a:r>
-              <a:rPr lang="en-US" sz="1400" dirty="0" smtClean="0"/>
-              <a:t>If </a:t>
-            </a:r>
-            <a:r>
-              <a:rPr lang="en-US" sz="1400" dirty="0"/>
-              <a:t>no boxes are checked, the search should return all job types.</a:t>
-            </a:r>
-          </a:p>
-          <a:p>
-            <a:pPr lvl="1" fontAlgn="base"/>
-            <a:r>
-              <a:rPr lang="en-US" sz="1400" dirty="0" smtClean="0"/>
-              <a:t>More </a:t>
-            </a:r>
-            <a:r>
-              <a:rPr lang="en-US" sz="1400" dirty="0"/>
-              <a:t>than one box can be checked.</a:t>
-            </a:r>
-          </a:p>
-          <a:p>
-            <a:pPr lvl="1" fontAlgn="base"/>
-            <a:r>
-              <a:rPr lang="en-US" sz="1400" dirty="0" smtClean="0"/>
-              <a:t>This </a:t>
-            </a:r>
-            <a:r>
-              <a:rPr lang="en-US" sz="1400" dirty="0"/>
-              <a:t>use case should apply to any or all of the following job types.</a:t>
-            </a:r>
-          </a:p>
-          <a:p>
-            <a:pPr lvl="2" fontAlgn="base"/>
-            <a:r>
-              <a:rPr lang="en-US" sz="1400" dirty="0"/>
-              <a:t> Full-time, Part-time, intern, contract, temp, other</a:t>
-            </a:r>
-            <a:r>
-              <a:rPr lang="en-US" sz="1400" dirty="0" smtClean="0"/>
-              <a:t>.</a:t>
-            </a:r>
-            <a:endParaRPr lang="en-US" sz="1400" dirty="0"/>
+          </a:p>
+          <a:p>
+            <a:pPr lvl="1"/>
+            <a:r>
+              <a:rPr lang="en-US" sz="1800" dirty="0" smtClean="0"/>
+              <a:t>List of jobs in range</a:t>
+            </a:r>
+          </a:p>
+          <a:p>
+            <a:pPr lvl="0">
+              <a:buNone/>
+            </a:pPr>
+            <a:endParaRPr lang="en-US" sz="1800" dirty="0"/>
           </a:p>
         </p:txBody>
       </p:sp>

</xml_diff>